<commit_message>
Added Part 6 - Microservices
</commit_message>
<xml_diff>
--- a/Presentation-Part5-Monolithic-Approaches.pptx
+++ b/Presentation-Part5-Monolithic-Approaches.pptx
@@ -872,7 +872,7 @@
           <a:noFill/>
           <a:extLst>
             <a:ext uri="{909E8E84-426E-40dd-AFC4-6F175D3DCCD1}">
-              <a14:hiddenFill xmlns="" xmlns:a14="http://schemas.microsoft.com/office/drawing/2010/main">
+              <a14:hiddenFill xmlns:a14="http://schemas.microsoft.com/office/drawing/2010/main" xmlns="">
                 <a:solidFill>
                   <a:srgbClr val="FFFFFF"/>
                 </a:solidFill>
@@ -932,7 +932,7 @@
             </a:ln>
             <a:extLst>
               <a:ext uri="{91240B29-F687-4f45-9708-019B960494DF}">
-                <a14:hiddenLine xmlns="" xmlns:a14="http://schemas.microsoft.com/office/drawing/2010/main" w="9525">
+                <a14:hiddenLine xmlns:a14="http://schemas.microsoft.com/office/drawing/2010/main" xmlns="" w="9525">
                   <a:solidFill>
                     <a:srgbClr val="000000"/>
                   </a:solidFill>
@@ -1022,7 +1022,7 @@
             </a:ln>
             <a:extLst>
               <a:ext uri="{91240B29-F687-4f45-9708-019B960494DF}">
-                <a14:hiddenLine xmlns="" xmlns:a14="http://schemas.microsoft.com/office/drawing/2010/main" w="9525">
+                <a14:hiddenLine xmlns:a14="http://schemas.microsoft.com/office/drawing/2010/main" xmlns="" w="9525">
                   <a:solidFill>
                     <a:srgbClr val="000000"/>
                   </a:solidFill>
@@ -1112,7 +1112,7 @@
             </a:ln>
             <a:extLst>
               <a:ext uri="{91240B29-F687-4f45-9708-019B960494DF}">
-                <a14:hiddenLine xmlns="" xmlns:a14="http://schemas.microsoft.com/office/drawing/2010/main" w="9525">
+                <a14:hiddenLine xmlns:a14="http://schemas.microsoft.com/office/drawing/2010/main" xmlns="" w="9525">
                   <a:solidFill>
                     <a:srgbClr val="000000"/>
                   </a:solidFill>
@@ -1146,7 +1146,7 @@
             </a:ln>
             <a:extLst>
               <a:ext uri="{91240B29-F687-4f45-9708-019B960494DF}">
-                <a14:hiddenLine xmlns="" xmlns:a14="http://schemas.microsoft.com/office/drawing/2010/main" w="9525">
+                <a14:hiddenLine xmlns:a14="http://schemas.microsoft.com/office/drawing/2010/main" xmlns="" w="9525">
                   <a:solidFill>
                     <a:srgbClr val="000000"/>
                   </a:solidFill>
@@ -1236,7 +1236,7 @@
             </a:ln>
             <a:extLst>
               <a:ext uri="{91240B29-F687-4f45-9708-019B960494DF}">
-                <a14:hiddenLine xmlns="" xmlns:a14="http://schemas.microsoft.com/office/drawing/2010/main" w="9525">
+                <a14:hiddenLine xmlns:a14="http://schemas.microsoft.com/office/drawing/2010/main" xmlns="" w="9525">
                   <a:solidFill>
                     <a:srgbClr val="000000"/>
                   </a:solidFill>
@@ -1298,7 +1298,7 @@
             </a:ln>
             <a:extLst>
               <a:ext uri="{91240B29-F687-4f45-9708-019B960494DF}">
-                <a14:hiddenLine xmlns="" xmlns:a14="http://schemas.microsoft.com/office/drawing/2010/main" w="9525">
+                <a14:hiddenLine xmlns:a14="http://schemas.microsoft.com/office/drawing/2010/main" xmlns="" w="9525">
                   <a:solidFill>
                     <a:srgbClr val="000000"/>
                   </a:solidFill>
@@ -1360,7 +1360,7 @@
             </a:ln>
             <a:extLst>
               <a:ext uri="{91240B29-F687-4f45-9708-019B960494DF}">
-                <a14:hiddenLine xmlns="" xmlns:a14="http://schemas.microsoft.com/office/drawing/2010/main" w="9525">
+                <a14:hiddenLine xmlns:a14="http://schemas.microsoft.com/office/drawing/2010/main" xmlns="" w="9525">
                   <a:solidFill>
                     <a:srgbClr val="000000"/>
                   </a:solidFill>
@@ -1450,7 +1450,7 @@
             </a:ln>
             <a:extLst>
               <a:ext uri="{91240B29-F687-4f45-9708-019B960494DF}">
-                <a14:hiddenLine xmlns="" xmlns:a14="http://schemas.microsoft.com/office/drawing/2010/main" w="9525">
+                <a14:hiddenLine xmlns:a14="http://schemas.microsoft.com/office/drawing/2010/main" xmlns="" w="9525">
                   <a:solidFill>
                     <a:srgbClr val="000000"/>
                   </a:solidFill>
@@ -1512,7 +1512,7 @@
             </a:ln>
             <a:extLst>
               <a:ext uri="{91240B29-F687-4f45-9708-019B960494DF}">
-                <a14:hiddenLine xmlns="" xmlns:a14="http://schemas.microsoft.com/office/drawing/2010/main" w="9525">
+                <a14:hiddenLine xmlns:a14="http://schemas.microsoft.com/office/drawing/2010/main" xmlns="" w="9525">
                   <a:solidFill>
                     <a:srgbClr val="000000"/>
                   </a:solidFill>
@@ -1574,7 +1574,7 @@
             </a:ln>
             <a:extLst>
               <a:ext uri="{91240B29-F687-4f45-9708-019B960494DF}">
-                <a14:hiddenLine xmlns="" xmlns:a14="http://schemas.microsoft.com/office/drawing/2010/main" w="9525">
+                <a14:hiddenLine xmlns:a14="http://schemas.microsoft.com/office/drawing/2010/main" xmlns="" w="9525">
                   <a:solidFill>
                     <a:srgbClr val="000000"/>
                   </a:solidFill>
@@ -1664,7 +1664,7 @@
             </a:ln>
             <a:extLst>
               <a:ext uri="{91240B29-F687-4f45-9708-019B960494DF}">
-                <a14:hiddenLine xmlns="" xmlns:a14="http://schemas.microsoft.com/office/drawing/2010/main" w="9525">
+                <a14:hiddenLine xmlns:a14="http://schemas.microsoft.com/office/drawing/2010/main" xmlns="" w="9525">
                   <a:solidFill>
                     <a:srgbClr val="000000"/>
                   </a:solidFill>
@@ -1754,7 +1754,7 @@
             </a:ln>
             <a:extLst>
               <a:ext uri="{91240B29-F687-4f45-9708-019B960494DF}">
-                <a14:hiddenLine xmlns="" xmlns:a14="http://schemas.microsoft.com/office/drawing/2010/main" w="9525">
+                <a14:hiddenLine xmlns:a14="http://schemas.microsoft.com/office/drawing/2010/main" xmlns="" w="9525">
                   <a:solidFill>
                     <a:srgbClr val="000000"/>
                   </a:solidFill>
@@ -1816,7 +1816,7 @@
             </a:ln>
             <a:extLst>
               <a:ext uri="{91240B29-F687-4f45-9708-019B960494DF}">
-                <a14:hiddenLine xmlns="" xmlns:a14="http://schemas.microsoft.com/office/drawing/2010/main" w="9525">
+                <a14:hiddenLine xmlns:a14="http://schemas.microsoft.com/office/drawing/2010/main" xmlns="" w="9525">
                   <a:solidFill>
                     <a:srgbClr val="000000"/>
                   </a:solidFill>
@@ -1926,7 +1926,7 @@
             </a:ln>
             <a:extLst>
               <a:ext uri="{91240B29-F687-4f45-9708-019B960494DF}">
-                <a14:hiddenLine xmlns="" xmlns:a14="http://schemas.microsoft.com/office/drawing/2010/main" w="9525">
+                <a14:hiddenLine xmlns:a14="http://schemas.microsoft.com/office/drawing/2010/main" xmlns="" w="9525">
                   <a:solidFill>
                     <a:srgbClr val="000000"/>
                   </a:solidFill>
@@ -1988,7 +1988,7 @@
             </a:ln>
             <a:extLst>
               <a:ext uri="{91240B29-F687-4f45-9708-019B960494DF}">
-                <a14:hiddenLine xmlns="" xmlns:a14="http://schemas.microsoft.com/office/drawing/2010/main" w="9525">
+                <a14:hiddenLine xmlns:a14="http://schemas.microsoft.com/office/drawing/2010/main" xmlns="" w="9525">
                   <a:solidFill>
                     <a:srgbClr val="000000"/>
                   </a:solidFill>
@@ -2078,7 +2078,7 @@
             </a:ln>
             <a:extLst>
               <a:ext uri="{91240B29-F687-4f45-9708-019B960494DF}">
-                <a14:hiddenLine xmlns="" xmlns:a14="http://schemas.microsoft.com/office/drawing/2010/main" w="9525">
+                <a14:hiddenLine xmlns:a14="http://schemas.microsoft.com/office/drawing/2010/main" xmlns="" w="9525">
                   <a:solidFill>
                     <a:srgbClr val="000000"/>
                   </a:solidFill>
@@ -2168,7 +2168,7 @@
             </a:ln>
             <a:extLst>
               <a:ext uri="{91240B29-F687-4f45-9708-019B960494DF}">
-                <a14:hiddenLine xmlns="" xmlns:a14="http://schemas.microsoft.com/office/drawing/2010/main" w="9525">
+                <a14:hiddenLine xmlns:a14="http://schemas.microsoft.com/office/drawing/2010/main" xmlns="" w="9525">
                   <a:solidFill>
                     <a:srgbClr val="000000"/>
                   </a:solidFill>
@@ -2230,7 +2230,7 @@
             </a:ln>
             <a:extLst>
               <a:ext uri="{91240B29-F687-4f45-9708-019B960494DF}">
-                <a14:hiddenLine xmlns="" xmlns:a14="http://schemas.microsoft.com/office/drawing/2010/main" w="9525">
+                <a14:hiddenLine xmlns:a14="http://schemas.microsoft.com/office/drawing/2010/main" xmlns="" w="9525">
                   <a:solidFill>
                     <a:srgbClr val="000000"/>
                   </a:solidFill>
@@ -2320,7 +2320,7 @@
             </a:ln>
             <a:extLst>
               <a:ext uri="{91240B29-F687-4f45-9708-019B960494DF}">
-                <a14:hiddenLine xmlns="" xmlns:a14="http://schemas.microsoft.com/office/drawing/2010/main" w="9525">
+                <a14:hiddenLine xmlns:a14="http://schemas.microsoft.com/office/drawing/2010/main" xmlns="" w="9525">
                   <a:solidFill>
                     <a:srgbClr val="000000"/>
                   </a:solidFill>
@@ -2410,7 +2410,7 @@
             </a:ln>
             <a:extLst>
               <a:ext uri="{91240B29-F687-4f45-9708-019B960494DF}">
-                <a14:hiddenLine xmlns="" xmlns:a14="http://schemas.microsoft.com/office/drawing/2010/main" w="9525">
+                <a14:hiddenLine xmlns:a14="http://schemas.microsoft.com/office/drawing/2010/main" xmlns="" w="9525">
                   <a:solidFill>
                     <a:srgbClr val="000000"/>
                   </a:solidFill>
@@ -2466,7 +2466,7 @@
             </a:ln>
             <a:extLst>
               <a:ext uri="{91240B29-F687-4f45-9708-019B960494DF}">
-                <a14:hiddenLine xmlns="" xmlns:a14="http://schemas.microsoft.com/office/drawing/2010/main" w="9525">
+                <a14:hiddenLine xmlns:a14="http://schemas.microsoft.com/office/drawing/2010/main" xmlns="" w="9525">
                   <a:solidFill>
                     <a:srgbClr val="000000"/>
                   </a:solidFill>
@@ -2556,7 +2556,7 @@
             </a:ln>
             <a:extLst>
               <a:ext uri="{91240B29-F687-4f45-9708-019B960494DF}">
-                <a14:hiddenLine xmlns="" xmlns:a14="http://schemas.microsoft.com/office/drawing/2010/main" w="9525">
+                <a14:hiddenLine xmlns:a14="http://schemas.microsoft.com/office/drawing/2010/main" xmlns="" w="9525">
                   <a:solidFill>
                     <a:srgbClr val="000000"/>
                   </a:solidFill>
@@ -2612,7 +2612,7 @@
             </a:ln>
             <a:extLst>
               <a:ext uri="{91240B29-F687-4f45-9708-019B960494DF}">
-                <a14:hiddenLine xmlns="" xmlns:a14="http://schemas.microsoft.com/office/drawing/2010/main" w="9525">
+                <a14:hiddenLine xmlns:a14="http://schemas.microsoft.com/office/drawing/2010/main" xmlns="" w="9525">
                   <a:solidFill>
                     <a:srgbClr val="000000"/>
                   </a:solidFill>
@@ -2702,7 +2702,7 @@
             </a:ln>
             <a:extLst>
               <a:ext uri="{91240B29-F687-4f45-9708-019B960494DF}">
-                <a14:hiddenLine xmlns="" xmlns:a14="http://schemas.microsoft.com/office/drawing/2010/main" w="9525">
+                <a14:hiddenLine xmlns:a14="http://schemas.microsoft.com/office/drawing/2010/main" xmlns="" w="9525">
                   <a:solidFill>
                     <a:srgbClr val="000000"/>
                   </a:solidFill>
@@ -2770,7 +2770,7 @@
             </a:ln>
             <a:extLst>
               <a:ext uri="{91240B29-F687-4f45-9708-019B960494DF}">
-                <a14:hiddenLine xmlns="" xmlns:a14="http://schemas.microsoft.com/office/drawing/2010/main" w="9525">
+                <a14:hiddenLine xmlns:a14="http://schemas.microsoft.com/office/drawing/2010/main" xmlns="" w="9525">
                   <a:solidFill>
                     <a:srgbClr val="000000"/>
                   </a:solidFill>
@@ -2860,7 +2860,7 @@
             </a:ln>
             <a:extLst>
               <a:ext uri="{91240B29-F687-4f45-9708-019B960494DF}">
-                <a14:hiddenLine xmlns="" xmlns:a14="http://schemas.microsoft.com/office/drawing/2010/main" w="9525">
+                <a14:hiddenLine xmlns:a14="http://schemas.microsoft.com/office/drawing/2010/main" xmlns="" w="9525">
                   <a:solidFill>
                     <a:srgbClr val="000000"/>
                   </a:solidFill>
@@ -2928,7 +2928,7 @@
             </a:ln>
             <a:extLst>
               <a:ext uri="{91240B29-F687-4f45-9708-019B960494DF}">
-                <a14:hiddenLine xmlns="" xmlns:a14="http://schemas.microsoft.com/office/drawing/2010/main" w="9525">
+                <a14:hiddenLine xmlns:a14="http://schemas.microsoft.com/office/drawing/2010/main" xmlns="" w="9525">
                   <a:solidFill>
                     <a:srgbClr val="000000"/>
                   </a:solidFill>
@@ -3018,7 +3018,7 @@
             </a:ln>
             <a:extLst>
               <a:ext uri="{91240B29-F687-4f45-9708-019B960494DF}">
-                <a14:hiddenLine xmlns="" xmlns:a14="http://schemas.microsoft.com/office/drawing/2010/main" w="9525">
+                <a14:hiddenLine xmlns:a14="http://schemas.microsoft.com/office/drawing/2010/main" xmlns="" w="9525">
                   <a:solidFill>
                     <a:srgbClr val="000000"/>
                   </a:solidFill>
@@ -3052,7 +3052,7 @@
             </a:ln>
             <a:extLst>
               <a:ext uri="{91240B29-F687-4f45-9708-019B960494DF}">
-                <a14:hiddenLine xmlns="" xmlns:a14="http://schemas.microsoft.com/office/drawing/2010/main" w="9525">
+                <a14:hiddenLine xmlns:a14="http://schemas.microsoft.com/office/drawing/2010/main" xmlns="" w="9525">
                   <a:solidFill>
                     <a:srgbClr val="000000"/>
                   </a:solidFill>
@@ -3142,7 +3142,7 @@
             </a:ln>
             <a:extLst>
               <a:ext uri="{91240B29-F687-4f45-9708-019B960494DF}">
-                <a14:hiddenLine xmlns="" xmlns:a14="http://schemas.microsoft.com/office/drawing/2010/main" w="9525">
+                <a14:hiddenLine xmlns:a14="http://schemas.microsoft.com/office/drawing/2010/main" xmlns="" w="9525">
                   <a:solidFill>
                     <a:srgbClr val="000000"/>
                   </a:solidFill>
@@ -3204,7 +3204,7 @@
             </a:ln>
             <a:extLst>
               <a:ext uri="{91240B29-F687-4f45-9708-019B960494DF}">
-                <a14:hiddenLine xmlns="" xmlns:a14="http://schemas.microsoft.com/office/drawing/2010/main" w="9525">
+                <a14:hiddenLine xmlns:a14="http://schemas.microsoft.com/office/drawing/2010/main" xmlns="" w="9525">
                   <a:solidFill>
                     <a:srgbClr val="000000"/>
                   </a:solidFill>
@@ -3266,7 +3266,7 @@
             </a:ln>
             <a:extLst>
               <a:ext uri="{91240B29-F687-4f45-9708-019B960494DF}">
-                <a14:hiddenLine xmlns="" xmlns:a14="http://schemas.microsoft.com/office/drawing/2010/main" w="9525">
+                <a14:hiddenLine xmlns:a14="http://schemas.microsoft.com/office/drawing/2010/main" xmlns="" w="9525">
                   <a:solidFill>
                     <a:srgbClr val="000000"/>
                   </a:solidFill>
@@ -3356,7 +3356,7 @@
             </a:ln>
             <a:extLst>
               <a:ext uri="{91240B29-F687-4f45-9708-019B960494DF}">
-                <a14:hiddenLine xmlns="" xmlns:a14="http://schemas.microsoft.com/office/drawing/2010/main" w="9525">
+                <a14:hiddenLine xmlns:a14="http://schemas.microsoft.com/office/drawing/2010/main" xmlns="" w="9525">
                   <a:solidFill>
                     <a:srgbClr val="000000"/>
                   </a:solidFill>
@@ -3424,7 +3424,7 @@
             </a:ln>
             <a:extLst>
               <a:ext uri="{91240B29-F687-4f45-9708-019B960494DF}">
-                <a14:hiddenLine xmlns="" xmlns:a14="http://schemas.microsoft.com/office/drawing/2010/main" w="9525">
+                <a14:hiddenLine xmlns:a14="http://schemas.microsoft.com/office/drawing/2010/main" xmlns="" w="9525">
                   <a:solidFill>
                     <a:srgbClr val="000000"/>
                   </a:solidFill>
@@ -3486,7 +3486,7 @@
             </a:ln>
             <a:extLst>
               <a:ext uri="{91240B29-F687-4f45-9708-019B960494DF}">
-                <a14:hiddenLine xmlns="" xmlns:a14="http://schemas.microsoft.com/office/drawing/2010/main" w="9525">
+                <a14:hiddenLine xmlns:a14="http://schemas.microsoft.com/office/drawing/2010/main" xmlns="" w="9525">
                   <a:solidFill>
                     <a:srgbClr val="000000"/>
                   </a:solidFill>
@@ -3576,7 +3576,7 @@
             </a:ln>
             <a:extLst>
               <a:ext uri="{91240B29-F687-4f45-9708-019B960494DF}">
-                <a14:hiddenLine xmlns="" xmlns:a14="http://schemas.microsoft.com/office/drawing/2010/main" w="9525">
+                <a14:hiddenLine xmlns:a14="http://schemas.microsoft.com/office/drawing/2010/main" xmlns="" w="9525">
                   <a:solidFill>
                     <a:srgbClr val="000000"/>
                   </a:solidFill>
@@ -3638,7 +3638,7 @@
             </a:ln>
             <a:extLst>
               <a:ext uri="{91240B29-F687-4f45-9708-019B960494DF}">
-                <a14:hiddenLine xmlns="" xmlns:a14="http://schemas.microsoft.com/office/drawing/2010/main" w="9525">
+                <a14:hiddenLine xmlns:a14="http://schemas.microsoft.com/office/drawing/2010/main" xmlns="" w="9525">
                   <a:solidFill>
                     <a:srgbClr val="000000"/>
                   </a:solidFill>
@@ -3728,7 +3728,7 @@
             </a:ln>
             <a:extLst>
               <a:ext uri="{91240B29-F687-4f45-9708-019B960494DF}">
-                <a14:hiddenLine xmlns="" xmlns:a14="http://schemas.microsoft.com/office/drawing/2010/main" w="9525">
+                <a14:hiddenLine xmlns:a14="http://schemas.microsoft.com/office/drawing/2010/main" xmlns="" w="9525">
                   <a:solidFill>
                     <a:srgbClr val="000000"/>
                   </a:solidFill>
@@ -3790,7 +3790,7 @@
             </a:ln>
             <a:extLst>
               <a:ext uri="{91240B29-F687-4f45-9708-019B960494DF}">
-                <a14:hiddenLine xmlns="" xmlns:a14="http://schemas.microsoft.com/office/drawing/2010/main" w="9525">
+                <a14:hiddenLine xmlns:a14="http://schemas.microsoft.com/office/drawing/2010/main" xmlns="" w="9525">
                   <a:solidFill>
                     <a:srgbClr val="000000"/>
                   </a:solidFill>
@@ -3880,7 +3880,7 @@
             </a:ln>
             <a:extLst>
               <a:ext uri="{91240B29-F687-4f45-9708-019B960494DF}">
-                <a14:hiddenLine xmlns="" xmlns:a14="http://schemas.microsoft.com/office/drawing/2010/main" w="9525">
+                <a14:hiddenLine xmlns:a14="http://schemas.microsoft.com/office/drawing/2010/main" xmlns="" w="9525">
                   <a:solidFill>
                     <a:srgbClr val="000000"/>
                   </a:solidFill>
@@ -3914,7 +3914,7 @@
             </a:ln>
             <a:extLst>
               <a:ext uri="{91240B29-F687-4f45-9708-019B960494DF}">
-                <a14:hiddenLine xmlns="" xmlns:a14="http://schemas.microsoft.com/office/drawing/2010/main" w="9525">
+                <a14:hiddenLine xmlns:a14="http://schemas.microsoft.com/office/drawing/2010/main" xmlns="" w="9525">
                   <a:solidFill>
                     <a:srgbClr val="000000"/>
                   </a:solidFill>
@@ -3979,7 +3979,7 @@
             </a:ln>
             <a:extLst>
               <a:ext uri="{91240B29-F687-4f45-9708-019B960494DF}">
-                <a14:hiddenLine xmlns="" xmlns:a14="http://schemas.microsoft.com/office/drawing/2010/main" w="9525">
+                <a14:hiddenLine xmlns:a14="http://schemas.microsoft.com/office/drawing/2010/main" xmlns="" w="9525">
                   <a:solidFill>
                     <a:srgbClr val="000000"/>
                   </a:solidFill>
@@ -4069,7 +4069,7 @@
             </a:ln>
             <a:extLst>
               <a:ext uri="{91240B29-F687-4f45-9708-019B960494DF}">
-                <a14:hiddenLine xmlns="" xmlns:a14="http://schemas.microsoft.com/office/drawing/2010/main" w="9525">
+                <a14:hiddenLine xmlns:a14="http://schemas.microsoft.com/office/drawing/2010/main" xmlns="" w="9525">
                   <a:solidFill>
                     <a:srgbClr val="000000"/>
                   </a:solidFill>
@@ -4131,7 +4131,7 @@
             </a:ln>
             <a:extLst>
               <a:ext uri="{91240B29-F687-4f45-9708-019B960494DF}">
-                <a14:hiddenLine xmlns="" xmlns:a14="http://schemas.microsoft.com/office/drawing/2010/main" w="9525">
+                <a14:hiddenLine xmlns:a14="http://schemas.microsoft.com/office/drawing/2010/main" xmlns="" w="9525">
                   <a:solidFill>
                     <a:srgbClr val="000000"/>
                   </a:solidFill>
@@ -4221,7 +4221,7 @@
             </a:ln>
             <a:extLst>
               <a:ext uri="{91240B29-F687-4f45-9708-019B960494DF}">
-                <a14:hiddenLine xmlns="" xmlns:a14="http://schemas.microsoft.com/office/drawing/2010/main" w="9525">
+                <a14:hiddenLine xmlns:a14="http://schemas.microsoft.com/office/drawing/2010/main" xmlns="" w="9525">
                   <a:solidFill>
                     <a:srgbClr val="000000"/>
                   </a:solidFill>
@@ -4311,7 +4311,7 @@
             </a:ln>
             <a:extLst>
               <a:ext uri="{91240B29-F687-4f45-9708-019B960494DF}">
-                <a14:hiddenLine xmlns="" xmlns:a14="http://schemas.microsoft.com/office/drawing/2010/main" w="9525">
+                <a14:hiddenLine xmlns:a14="http://schemas.microsoft.com/office/drawing/2010/main" xmlns="" w="9525">
                   <a:solidFill>
                     <a:srgbClr val="000000"/>
                   </a:solidFill>
@@ -4376,7 +4376,7 @@
             </a:ln>
             <a:extLst>
               <a:ext uri="{91240B29-F687-4f45-9708-019B960494DF}">
-                <a14:hiddenLine xmlns="" xmlns:a14="http://schemas.microsoft.com/office/drawing/2010/main" w="9525">
+                <a14:hiddenLine xmlns:a14="http://schemas.microsoft.com/office/drawing/2010/main" xmlns="" w="9525">
                   <a:solidFill>
                     <a:srgbClr val="000000"/>
                   </a:solidFill>
@@ -4438,7 +4438,7 @@
             </a:ln>
             <a:extLst>
               <a:ext uri="{91240B29-F687-4f45-9708-019B960494DF}">
-                <a14:hiddenLine xmlns="" xmlns:a14="http://schemas.microsoft.com/office/drawing/2010/main" w="9525">
+                <a14:hiddenLine xmlns:a14="http://schemas.microsoft.com/office/drawing/2010/main" xmlns="" w="9525">
                   <a:solidFill>
                     <a:srgbClr val="000000"/>
                   </a:solidFill>
@@ -4528,7 +4528,7 @@
             </a:ln>
             <a:extLst>
               <a:ext uri="{91240B29-F687-4f45-9708-019B960494DF}">
-                <a14:hiddenLine xmlns="" xmlns:a14="http://schemas.microsoft.com/office/drawing/2010/main" w="9525">
+                <a14:hiddenLine xmlns:a14="http://schemas.microsoft.com/office/drawing/2010/main" xmlns="" w="9525">
                   <a:solidFill>
                     <a:srgbClr val="000000"/>
                   </a:solidFill>
@@ -4618,7 +4618,7 @@
             </a:ln>
             <a:extLst>
               <a:ext uri="{91240B29-F687-4f45-9708-019B960494DF}">
-                <a14:hiddenLine xmlns="" xmlns:a14="http://schemas.microsoft.com/office/drawing/2010/main" w="9525">
+                <a14:hiddenLine xmlns:a14="http://schemas.microsoft.com/office/drawing/2010/main" xmlns="" w="9525">
                   <a:solidFill>
                     <a:srgbClr val="000000"/>
                   </a:solidFill>
@@ -4680,7 +4680,7 @@
             </a:ln>
             <a:extLst>
               <a:ext uri="{91240B29-F687-4f45-9708-019B960494DF}">
-                <a14:hiddenLine xmlns="" xmlns:a14="http://schemas.microsoft.com/office/drawing/2010/main" w="9525">
+                <a14:hiddenLine xmlns:a14="http://schemas.microsoft.com/office/drawing/2010/main" xmlns="" w="9525">
                   <a:solidFill>
                     <a:srgbClr val="000000"/>
                   </a:solidFill>
@@ -4800,7 +4800,7 @@
             </a:ln>
             <a:extLst>
               <a:ext uri="{91240B29-F687-4f45-9708-019B960494DF}">
-                <a14:hiddenLine xmlns="" xmlns:a14="http://schemas.microsoft.com/office/drawing/2010/main" w="9525">
+                <a14:hiddenLine xmlns:a14="http://schemas.microsoft.com/office/drawing/2010/main" xmlns="" w="9525">
                   <a:solidFill>
                     <a:srgbClr val="000000"/>
                   </a:solidFill>
@@ -4868,7 +4868,7 @@
             </a:ln>
             <a:extLst>
               <a:ext uri="{91240B29-F687-4f45-9708-019B960494DF}">
-                <a14:hiddenLine xmlns="" xmlns:a14="http://schemas.microsoft.com/office/drawing/2010/main" w="9525">
+                <a14:hiddenLine xmlns:a14="http://schemas.microsoft.com/office/drawing/2010/main" xmlns="" w="9525">
                   <a:solidFill>
                     <a:srgbClr val="000000"/>
                   </a:solidFill>
@@ -4958,7 +4958,7 @@
             </a:ln>
             <a:extLst>
               <a:ext uri="{91240B29-F687-4f45-9708-019B960494DF}">
-                <a14:hiddenLine xmlns="" xmlns:a14="http://schemas.microsoft.com/office/drawing/2010/main" w="9525">
+                <a14:hiddenLine xmlns:a14="http://schemas.microsoft.com/office/drawing/2010/main" xmlns="" w="9525">
                   <a:solidFill>
                     <a:srgbClr val="000000"/>
                   </a:solidFill>
@@ -10263,7 +10263,7 @@
           <a:noFill/>
           <a:extLst>
             <a:ext uri="{909E8E84-426E-40dd-AFC4-6F175D3DCCD1}">
-              <a14:hiddenFill xmlns="" xmlns:a14="http://schemas.microsoft.com/office/drawing/2010/main">
+              <a14:hiddenFill xmlns:a14="http://schemas.microsoft.com/office/drawing/2010/main" xmlns="">
                 <a:solidFill>
                   <a:srgbClr val="FFFFFF"/>
                 </a:solidFill>
@@ -10337,7 +10337,7 @@
               </a:ln>
               <a:extLst>
                 <a:ext uri="{91240B29-F687-4f45-9708-019B960494DF}">
-                  <a14:hiddenLine xmlns="" xmlns:a14="http://schemas.microsoft.com/office/drawing/2010/main" w="9525">
+                  <a14:hiddenLine xmlns:a14="http://schemas.microsoft.com/office/drawing/2010/main" xmlns="" w="9525">
                     <a:solidFill>
                       <a:srgbClr val="000000"/>
                     </a:solidFill>
@@ -10427,7 +10427,7 @@
               </a:ln>
               <a:extLst>
                 <a:ext uri="{91240B29-F687-4f45-9708-019B960494DF}">
-                  <a14:hiddenLine xmlns="" xmlns:a14="http://schemas.microsoft.com/office/drawing/2010/main" w="9525">
+                  <a14:hiddenLine xmlns:a14="http://schemas.microsoft.com/office/drawing/2010/main" xmlns="" w="9525">
                     <a:solidFill>
                       <a:srgbClr val="000000"/>
                     </a:solidFill>
@@ -10517,7 +10517,7 @@
               </a:ln>
               <a:extLst>
                 <a:ext uri="{91240B29-F687-4f45-9708-019B960494DF}">
-                  <a14:hiddenLine xmlns="" xmlns:a14="http://schemas.microsoft.com/office/drawing/2010/main" w="9525">
+                  <a14:hiddenLine xmlns:a14="http://schemas.microsoft.com/office/drawing/2010/main" xmlns="" w="9525">
                     <a:solidFill>
                       <a:srgbClr val="000000"/>
                     </a:solidFill>
@@ -10579,7 +10579,7 @@
               </a:ln>
               <a:extLst>
                 <a:ext uri="{91240B29-F687-4f45-9708-019B960494DF}">
-                  <a14:hiddenLine xmlns="" xmlns:a14="http://schemas.microsoft.com/office/drawing/2010/main" w="9525">
+                  <a14:hiddenLine xmlns:a14="http://schemas.microsoft.com/office/drawing/2010/main" xmlns="" w="9525">
                     <a:solidFill>
                       <a:srgbClr val="000000"/>
                     </a:solidFill>
@@ -10669,7 +10669,7 @@
               </a:ln>
               <a:extLst>
                 <a:ext uri="{91240B29-F687-4f45-9708-019B960494DF}">
-                  <a14:hiddenLine xmlns="" xmlns:a14="http://schemas.microsoft.com/office/drawing/2010/main" w="9525">
+                  <a14:hiddenLine xmlns:a14="http://schemas.microsoft.com/office/drawing/2010/main" xmlns="" w="9525">
                     <a:solidFill>
                       <a:srgbClr val="000000"/>
                     </a:solidFill>
@@ -10731,7 +10731,7 @@
               </a:ln>
               <a:extLst>
                 <a:ext uri="{91240B29-F687-4f45-9708-019B960494DF}">
-                  <a14:hiddenLine xmlns="" xmlns:a14="http://schemas.microsoft.com/office/drawing/2010/main" w="9525">
+                  <a14:hiddenLine xmlns:a14="http://schemas.microsoft.com/office/drawing/2010/main" xmlns="" w="9525">
                     <a:solidFill>
                       <a:srgbClr val="000000"/>
                     </a:solidFill>
@@ -10793,7 +10793,7 @@
               </a:ln>
               <a:extLst>
                 <a:ext uri="{91240B29-F687-4f45-9708-019B960494DF}">
-                  <a14:hiddenLine xmlns="" xmlns:a14="http://schemas.microsoft.com/office/drawing/2010/main" w="9525">
+                  <a14:hiddenLine xmlns:a14="http://schemas.microsoft.com/office/drawing/2010/main" xmlns="" w="9525">
                     <a:solidFill>
                       <a:srgbClr val="000000"/>
                     </a:solidFill>
@@ -10883,7 +10883,7 @@
               </a:ln>
               <a:extLst>
                 <a:ext uri="{91240B29-F687-4f45-9708-019B960494DF}">
-                  <a14:hiddenLine xmlns="" xmlns:a14="http://schemas.microsoft.com/office/drawing/2010/main" w="9525">
+                  <a14:hiddenLine xmlns:a14="http://schemas.microsoft.com/office/drawing/2010/main" xmlns="" w="9525">
                     <a:solidFill>
                       <a:srgbClr val="000000"/>
                     </a:solidFill>
@@ -10973,7 +10973,7 @@
               </a:ln>
               <a:extLst>
                 <a:ext uri="{91240B29-F687-4f45-9708-019B960494DF}">
-                  <a14:hiddenLine xmlns="" xmlns:a14="http://schemas.microsoft.com/office/drawing/2010/main" w="9525">
+                  <a14:hiddenLine xmlns:a14="http://schemas.microsoft.com/office/drawing/2010/main" xmlns="" w="9525">
                     <a:solidFill>
                       <a:srgbClr val="000000"/>
                     </a:solidFill>
@@ -11035,7 +11035,7 @@
               </a:ln>
               <a:extLst>
                 <a:ext uri="{91240B29-F687-4f45-9708-019B960494DF}">
-                  <a14:hiddenLine xmlns="" xmlns:a14="http://schemas.microsoft.com/office/drawing/2010/main" w="9525">
+                  <a14:hiddenLine xmlns:a14="http://schemas.microsoft.com/office/drawing/2010/main" xmlns="" w="9525">
                     <a:solidFill>
                       <a:srgbClr val="000000"/>
                     </a:solidFill>
@@ -11145,7 +11145,7 @@
               </a:ln>
               <a:extLst>
                 <a:ext uri="{91240B29-F687-4f45-9708-019B960494DF}">
-                  <a14:hiddenLine xmlns="" xmlns:a14="http://schemas.microsoft.com/office/drawing/2010/main" w="9525">
+                  <a14:hiddenLine xmlns:a14="http://schemas.microsoft.com/office/drawing/2010/main" xmlns="" w="9525">
                     <a:solidFill>
                       <a:srgbClr val="000000"/>
                     </a:solidFill>
@@ -11229,7 +11229,7 @@
               </a:ln>
               <a:extLst>
                 <a:ext uri="{91240B29-F687-4f45-9708-019B960494DF}">
-                  <a14:hiddenLine xmlns="" xmlns:a14="http://schemas.microsoft.com/office/drawing/2010/main" w="9525">
+                  <a14:hiddenLine xmlns:a14="http://schemas.microsoft.com/office/drawing/2010/main" xmlns="" w="9525">
                     <a:solidFill>
                       <a:srgbClr val="000000"/>
                     </a:solidFill>
@@ -11291,7 +11291,7 @@
               </a:ln>
               <a:extLst>
                 <a:ext uri="{91240B29-F687-4f45-9708-019B960494DF}">
-                  <a14:hiddenLine xmlns="" xmlns:a14="http://schemas.microsoft.com/office/drawing/2010/main" w="9525">
+                  <a14:hiddenLine xmlns:a14="http://schemas.microsoft.com/office/drawing/2010/main" xmlns="" w="9525">
                     <a:solidFill>
                       <a:srgbClr val="000000"/>
                     </a:solidFill>
@@ -11353,7 +11353,7 @@
               </a:ln>
               <a:extLst>
                 <a:ext uri="{91240B29-F687-4f45-9708-019B960494DF}">
-                  <a14:hiddenLine xmlns="" xmlns:a14="http://schemas.microsoft.com/office/drawing/2010/main" w="9525">
+                  <a14:hiddenLine xmlns:a14="http://schemas.microsoft.com/office/drawing/2010/main" xmlns="" w="9525">
                     <a:solidFill>
                       <a:srgbClr val="000000"/>
                     </a:solidFill>
@@ -11443,7 +11443,7 @@
               </a:ln>
               <a:extLst>
                 <a:ext uri="{91240B29-F687-4f45-9708-019B960494DF}">
-                  <a14:hiddenLine xmlns="" xmlns:a14="http://schemas.microsoft.com/office/drawing/2010/main" w="9525">
+                  <a14:hiddenLine xmlns:a14="http://schemas.microsoft.com/office/drawing/2010/main" xmlns="" w="9525">
                     <a:solidFill>
                       <a:srgbClr val="000000"/>
                     </a:solidFill>
@@ -11477,7 +11477,7 @@
               </a:ln>
               <a:extLst>
                 <a:ext uri="{91240B29-F687-4f45-9708-019B960494DF}">
-                  <a14:hiddenLine xmlns="" xmlns:a14="http://schemas.microsoft.com/office/drawing/2010/main" w="9525">
+                  <a14:hiddenLine xmlns:a14="http://schemas.microsoft.com/office/drawing/2010/main" xmlns="" w="9525">
                     <a:solidFill>
                       <a:srgbClr val="000000"/>
                     </a:solidFill>
@@ -11542,7 +11542,7 @@
               </a:ln>
               <a:extLst>
                 <a:ext uri="{91240B29-F687-4f45-9708-019B960494DF}">
-                  <a14:hiddenLine xmlns="" xmlns:a14="http://schemas.microsoft.com/office/drawing/2010/main" w="9525">
+                  <a14:hiddenLine xmlns:a14="http://schemas.microsoft.com/office/drawing/2010/main" xmlns="" w="9525">
                     <a:solidFill>
                       <a:srgbClr val="000000"/>
                     </a:solidFill>
@@ -11632,7 +11632,7 @@
               </a:ln>
               <a:extLst>
                 <a:ext uri="{91240B29-F687-4f45-9708-019B960494DF}">
-                  <a14:hiddenLine xmlns="" xmlns:a14="http://schemas.microsoft.com/office/drawing/2010/main" w="9525">
+                  <a14:hiddenLine xmlns:a14="http://schemas.microsoft.com/office/drawing/2010/main" xmlns="" w="9525">
                     <a:solidFill>
                       <a:srgbClr val="000000"/>
                     </a:solidFill>
@@ -11694,7 +11694,7 @@
               </a:ln>
               <a:extLst>
                 <a:ext uri="{91240B29-F687-4f45-9708-019B960494DF}">
-                  <a14:hiddenLine xmlns="" xmlns:a14="http://schemas.microsoft.com/office/drawing/2010/main" w="9525">
+                  <a14:hiddenLine xmlns:a14="http://schemas.microsoft.com/office/drawing/2010/main" xmlns="" w="9525">
                     <a:solidFill>
                       <a:srgbClr val="000000"/>
                     </a:solidFill>
@@ -11784,7 +11784,7 @@
               </a:ln>
               <a:extLst>
                 <a:ext uri="{91240B29-F687-4f45-9708-019B960494DF}">
-                  <a14:hiddenLine xmlns="" xmlns:a14="http://schemas.microsoft.com/office/drawing/2010/main" w="9525">
+                  <a14:hiddenLine xmlns:a14="http://schemas.microsoft.com/office/drawing/2010/main" xmlns="" w="9525">
                     <a:solidFill>
                       <a:srgbClr val="000000"/>
                     </a:solidFill>
@@ -11849,7 +11849,7 @@
               </a:ln>
               <a:extLst>
                 <a:ext uri="{91240B29-F687-4f45-9708-019B960494DF}">
-                  <a14:hiddenLine xmlns="" xmlns:a14="http://schemas.microsoft.com/office/drawing/2010/main" w="9525">
+                  <a14:hiddenLine xmlns:a14="http://schemas.microsoft.com/office/drawing/2010/main" xmlns="" w="9525">
                     <a:solidFill>
                       <a:srgbClr val="000000"/>
                     </a:solidFill>
@@ -11911,7 +11911,7 @@
               </a:ln>
               <a:extLst>
                 <a:ext uri="{91240B29-F687-4f45-9708-019B960494DF}">
-                  <a14:hiddenLine xmlns="" xmlns:a14="http://schemas.microsoft.com/office/drawing/2010/main" w="9525">
+                  <a14:hiddenLine xmlns:a14="http://schemas.microsoft.com/office/drawing/2010/main" xmlns="" w="9525">
                     <a:solidFill>
                       <a:srgbClr val="000000"/>
                     </a:solidFill>
@@ -12001,7 +12001,7 @@
               </a:ln>
               <a:extLst>
                 <a:ext uri="{91240B29-F687-4f45-9708-019B960494DF}">
-                  <a14:hiddenLine xmlns="" xmlns:a14="http://schemas.microsoft.com/office/drawing/2010/main" w="9525">
+                  <a14:hiddenLine xmlns:a14="http://schemas.microsoft.com/office/drawing/2010/main" xmlns="" w="9525">
                     <a:solidFill>
                       <a:srgbClr val="000000"/>
                     </a:solidFill>
@@ -12091,7 +12091,7 @@
               </a:ln>
               <a:extLst>
                 <a:ext uri="{91240B29-F687-4f45-9708-019B960494DF}">
-                  <a14:hiddenLine xmlns="" xmlns:a14="http://schemas.microsoft.com/office/drawing/2010/main" w="9525">
+                  <a14:hiddenLine xmlns:a14="http://schemas.microsoft.com/office/drawing/2010/main" xmlns="" w="9525">
                     <a:solidFill>
                       <a:srgbClr val="000000"/>
                     </a:solidFill>
@@ -12156,7 +12156,7 @@
               </a:ln>
               <a:extLst>
                 <a:ext uri="{91240B29-F687-4f45-9708-019B960494DF}">
-                  <a14:hiddenLine xmlns="" xmlns:a14="http://schemas.microsoft.com/office/drawing/2010/main" w="9525">
+                  <a14:hiddenLine xmlns:a14="http://schemas.microsoft.com/office/drawing/2010/main" xmlns="" w="9525">
                     <a:solidFill>
                       <a:srgbClr val="000000"/>
                     </a:solidFill>
@@ -12276,7 +12276,7 @@
               </a:ln>
               <a:extLst>
                 <a:ext uri="{91240B29-F687-4f45-9708-019B960494DF}">
-                  <a14:hiddenLine xmlns="" xmlns:a14="http://schemas.microsoft.com/office/drawing/2010/main" w="9525">
+                  <a14:hiddenLine xmlns:a14="http://schemas.microsoft.com/office/drawing/2010/main" xmlns="" w="9525">
                     <a:solidFill>
                       <a:srgbClr val="000000"/>
                     </a:solidFill>
@@ -12374,7 +12374,7 @@
               </a:ln>
               <a:extLst>
                 <a:ext uri="{91240B29-F687-4f45-9708-019B960494DF}">
-                  <a14:hiddenLine xmlns="" xmlns:a14="http://schemas.microsoft.com/office/drawing/2010/main" w="9525">
+                  <a14:hiddenLine xmlns:a14="http://schemas.microsoft.com/office/drawing/2010/main" xmlns="" w="9525">
                     <a:solidFill>
                       <a:srgbClr val="000000"/>
                     </a:solidFill>
@@ -12489,7 +12489,7 @@
               </a:ln>
               <a:extLst>
                 <a:ext uri="{91240B29-F687-4f45-9708-019B960494DF}">
-                  <a14:hiddenLine xmlns="" xmlns:a14="http://schemas.microsoft.com/office/drawing/2010/main" w="9525">
+                  <a14:hiddenLine xmlns:a14="http://schemas.microsoft.com/office/drawing/2010/main" xmlns="" w="9525">
                     <a:solidFill>
                       <a:srgbClr val="000000"/>
                     </a:solidFill>
@@ -12579,7 +12579,7 @@
               </a:ln>
               <a:extLst>
                 <a:ext uri="{91240B29-F687-4f45-9708-019B960494DF}">
-                  <a14:hiddenLine xmlns="" xmlns:a14="http://schemas.microsoft.com/office/drawing/2010/main" w="9525">
+                  <a14:hiddenLine xmlns:a14="http://schemas.microsoft.com/office/drawing/2010/main" xmlns="" w="9525">
                     <a:solidFill>
                       <a:srgbClr val="000000"/>
                     </a:solidFill>
@@ -12644,7 +12644,7 @@
               </a:ln>
               <a:extLst>
                 <a:ext uri="{91240B29-F687-4f45-9708-019B960494DF}">
-                  <a14:hiddenLine xmlns="" xmlns:a14="http://schemas.microsoft.com/office/drawing/2010/main" w="9525">
+                  <a14:hiddenLine xmlns:a14="http://schemas.microsoft.com/office/drawing/2010/main" xmlns="" w="9525">
                     <a:solidFill>
                       <a:srgbClr val="000000"/>
                     </a:solidFill>
@@ -12734,7 +12734,7 @@
               </a:ln>
               <a:extLst>
                 <a:ext uri="{91240B29-F687-4f45-9708-019B960494DF}">
-                  <a14:hiddenLine xmlns="" xmlns:a14="http://schemas.microsoft.com/office/drawing/2010/main" w="9525">
+                  <a14:hiddenLine xmlns:a14="http://schemas.microsoft.com/office/drawing/2010/main" xmlns="" w="9525">
                     <a:solidFill>
                       <a:srgbClr val="000000"/>
                     </a:solidFill>
@@ -12802,7 +12802,7 @@
               </a:ln>
               <a:extLst>
                 <a:ext uri="{91240B29-F687-4f45-9708-019B960494DF}">
-                  <a14:hiddenLine xmlns="" xmlns:a14="http://schemas.microsoft.com/office/drawing/2010/main" w="9525">
+                  <a14:hiddenLine xmlns:a14="http://schemas.microsoft.com/office/drawing/2010/main" xmlns="" w="9525">
                     <a:solidFill>
                       <a:srgbClr val="000000"/>
                     </a:solidFill>
@@ -12892,7 +12892,7 @@
               </a:ln>
               <a:extLst>
                 <a:ext uri="{91240B29-F687-4f45-9708-019B960494DF}">
-                  <a14:hiddenLine xmlns="" xmlns:a14="http://schemas.microsoft.com/office/drawing/2010/main" w="9525">
+                  <a14:hiddenLine xmlns:a14="http://schemas.microsoft.com/office/drawing/2010/main" xmlns="" w="9525">
                     <a:solidFill>
                       <a:srgbClr val="000000"/>
                     </a:solidFill>
@@ -12960,7 +12960,7 @@
               </a:ln>
               <a:extLst>
                 <a:ext uri="{91240B29-F687-4f45-9708-019B960494DF}">
-                  <a14:hiddenLine xmlns="" xmlns:a14="http://schemas.microsoft.com/office/drawing/2010/main" w="9525">
+                  <a14:hiddenLine xmlns:a14="http://schemas.microsoft.com/office/drawing/2010/main" xmlns="" w="9525">
                     <a:solidFill>
                       <a:srgbClr val="000000"/>
                     </a:solidFill>
@@ -13050,7 +13050,7 @@
               </a:ln>
               <a:extLst>
                 <a:ext uri="{91240B29-F687-4f45-9708-019B960494DF}">
-                  <a14:hiddenLine xmlns="" xmlns:a14="http://schemas.microsoft.com/office/drawing/2010/main" w="9525">
+                  <a14:hiddenLine xmlns:a14="http://schemas.microsoft.com/office/drawing/2010/main" xmlns="" w="9525">
                     <a:solidFill>
                       <a:srgbClr val="000000"/>
                     </a:solidFill>
@@ -13084,7 +13084,7 @@
               </a:ln>
               <a:extLst>
                 <a:ext uri="{91240B29-F687-4f45-9708-019B960494DF}">
-                  <a14:hiddenLine xmlns="" xmlns:a14="http://schemas.microsoft.com/office/drawing/2010/main" w="9525">
+                  <a14:hiddenLine xmlns:a14="http://schemas.microsoft.com/office/drawing/2010/main" xmlns="" w="9525">
                     <a:solidFill>
                       <a:srgbClr val="000000"/>
                     </a:solidFill>
@@ -20303,7 +20303,7 @@
           <a:p>
             <a:r>
               <a:rPr lang="en-GB" dirty="0"/>
-              <a:t>Learning curve (why this workshop was a success) </a:t>
+              <a:t>Learning curve</a:t>
             </a:r>
           </a:p>
           <a:p>

</xml_diff>